<commit_message>
correction textes + points médians
</commit_message>
<xml_diff>
--- a/Workshop_Presentation.pptx
+++ b/Workshop_Presentation.pptx
@@ -197,6 +197,45 @@
       </pc:sldChg>
     </pc:docChg>
   </pc:docChgLst>
+  <pc:docChgLst>
+    <pc:chgData name="Caroline Poveda" userId="dcb7646f-c2e8-4537-bd71-c5d58d22a638" providerId="ADAL" clId="{83CAEAE6-BB49-464F-9BC9-47112314F7E4}"/>
+    <pc:docChg chg="modSld">
+      <pc:chgData name="Caroline Poveda" userId="dcb7646f-c2e8-4537-bd71-c5d58d22a638" providerId="ADAL" clId="{83CAEAE6-BB49-464F-9BC9-47112314F7E4}" dt="2025-12-07T15:48:54.177" v="14" actId="20577"/>
+      <pc:docMkLst>
+        <pc:docMk/>
+      </pc:docMkLst>
+      <pc:sldChg chg="modSp mod">
+        <pc:chgData name="Caroline Poveda" userId="dcb7646f-c2e8-4537-bd71-c5d58d22a638" providerId="ADAL" clId="{83CAEAE6-BB49-464F-9BC9-47112314F7E4}" dt="2025-12-07T15:47:31.410" v="0" actId="20577"/>
+        <pc:sldMkLst>
+          <pc:docMk/>
+          <pc:sldMk cId="1313342067" sldId="258"/>
+        </pc:sldMkLst>
+        <pc:spChg chg="mod">
+          <ac:chgData name="Caroline Poveda" userId="dcb7646f-c2e8-4537-bd71-c5d58d22a638" providerId="ADAL" clId="{83CAEAE6-BB49-464F-9BC9-47112314F7E4}" dt="2025-12-07T15:47:31.410" v="0" actId="20577"/>
+          <ac:spMkLst>
+            <pc:docMk/>
+            <pc:sldMk cId="1313342067" sldId="258"/>
+            <ac:spMk id="3" creationId="{E4E42176-A5A3-D660-B2B1-D3DC1825802A}"/>
+          </ac:spMkLst>
+        </pc:spChg>
+      </pc:sldChg>
+      <pc:sldChg chg="modSp mod">
+        <pc:chgData name="Caroline Poveda" userId="dcb7646f-c2e8-4537-bd71-c5d58d22a638" providerId="ADAL" clId="{83CAEAE6-BB49-464F-9BC9-47112314F7E4}" dt="2025-12-07T15:48:54.177" v="14" actId="20577"/>
+        <pc:sldMkLst>
+          <pc:docMk/>
+          <pc:sldMk cId="2686530392" sldId="260"/>
+        </pc:sldMkLst>
+        <pc:spChg chg="mod">
+          <ac:chgData name="Caroline Poveda" userId="dcb7646f-c2e8-4537-bd71-c5d58d22a638" providerId="ADAL" clId="{83CAEAE6-BB49-464F-9BC9-47112314F7E4}" dt="2025-12-07T15:48:54.177" v="14" actId="20577"/>
+          <ac:spMkLst>
+            <pc:docMk/>
+            <pc:sldMk cId="2686530392" sldId="260"/>
+            <ac:spMk id="3" creationId="{3363B020-D80B-85DE-445B-E9EB195A97FD}"/>
+          </ac:spMkLst>
+        </pc:spChg>
+      </pc:sldChg>
+    </pc:docChg>
+  </pc:docChgLst>
 </pc:chgInfo>
 </file>
 
@@ -349,7 +388,7 @@
           <a:p>
             <a:fld id="{FCC507AA-0AF3-499F-8B74-17B245327FCA}" type="datetimeFigureOut">
               <a:rPr lang="fr-BE" smtClean="0"/>
-              <a:t>04-12-25</a:t>
+              <a:t>07-12-25</a:t>
             </a:fld>
             <a:endParaRPr lang="fr-BE"/>
           </a:p>
@@ -403,7 +442,7 @@
           <a:p>
             <a:fld id="{AFF9D4DE-D345-4225-9BC5-22E5FE69C334}" type="slidenum">
               <a:rPr lang="fr-BE" smtClean="0"/>
-              <a:t>‹#›</a:t>
+              <a:t>‹N°›</a:t>
             </a:fld>
             <a:endParaRPr lang="fr-BE"/>
           </a:p>
@@ -549,7 +588,7 @@
           <a:p>
             <a:fld id="{FCC507AA-0AF3-499F-8B74-17B245327FCA}" type="datetimeFigureOut">
               <a:rPr lang="fr-BE" smtClean="0"/>
-              <a:t>04-12-25</a:t>
+              <a:t>07-12-25</a:t>
             </a:fld>
             <a:endParaRPr lang="fr-BE"/>
           </a:p>
@@ -603,7 +642,7 @@
           <a:p>
             <a:fld id="{AFF9D4DE-D345-4225-9BC5-22E5FE69C334}" type="slidenum">
               <a:rPr lang="fr-BE" smtClean="0"/>
-              <a:t>‹#›</a:t>
+              <a:t>‹N°›</a:t>
             </a:fld>
             <a:endParaRPr lang="fr-BE"/>
           </a:p>
@@ -759,7 +798,7 @@
           <a:p>
             <a:fld id="{FCC507AA-0AF3-499F-8B74-17B245327FCA}" type="datetimeFigureOut">
               <a:rPr lang="fr-BE" smtClean="0"/>
-              <a:t>04-12-25</a:t>
+              <a:t>07-12-25</a:t>
             </a:fld>
             <a:endParaRPr lang="fr-BE"/>
           </a:p>
@@ -813,7 +852,7 @@
           <a:p>
             <a:fld id="{AFF9D4DE-D345-4225-9BC5-22E5FE69C334}" type="slidenum">
               <a:rPr lang="fr-BE" smtClean="0"/>
-              <a:t>‹#›</a:t>
+              <a:t>‹N°›</a:t>
             </a:fld>
             <a:endParaRPr lang="fr-BE"/>
           </a:p>
@@ -959,7 +998,7 @@
           <a:p>
             <a:fld id="{FCC507AA-0AF3-499F-8B74-17B245327FCA}" type="datetimeFigureOut">
               <a:rPr lang="fr-BE" smtClean="0"/>
-              <a:t>04-12-25</a:t>
+              <a:t>07-12-25</a:t>
             </a:fld>
             <a:endParaRPr lang="fr-BE"/>
           </a:p>
@@ -1013,7 +1052,7 @@
           <a:p>
             <a:fld id="{AFF9D4DE-D345-4225-9BC5-22E5FE69C334}" type="slidenum">
               <a:rPr lang="fr-BE" smtClean="0"/>
-              <a:t>‹#›</a:t>
+              <a:t>‹N°›</a:t>
             </a:fld>
             <a:endParaRPr lang="fr-BE"/>
           </a:p>
@@ -1235,7 +1274,7 @@
           <a:p>
             <a:fld id="{FCC507AA-0AF3-499F-8B74-17B245327FCA}" type="datetimeFigureOut">
               <a:rPr lang="fr-BE" smtClean="0"/>
-              <a:t>04-12-25</a:t>
+              <a:t>07-12-25</a:t>
             </a:fld>
             <a:endParaRPr lang="fr-BE"/>
           </a:p>
@@ -1289,7 +1328,7 @@
           <a:p>
             <a:fld id="{AFF9D4DE-D345-4225-9BC5-22E5FE69C334}" type="slidenum">
               <a:rPr lang="fr-BE" smtClean="0"/>
-              <a:t>‹#›</a:t>
+              <a:t>‹N°›</a:t>
             </a:fld>
             <a:endParaRPr lang="fr-BE"/>
           </a:p>
@@ -1503,7 +1542,7 @@
           <a:p>
             <a:fld id="{FCC507AA-0AF3-499F-8B74-17B245327FCA}" type="datetimeFigureOut">
               <a:rPr lang="fr-BE" smtClean="0"/>
-              <a:t>04-12-25</a:t>
+              <a:t>07-12-25</a:t>
             </a:fld>
             <a:endParaRPr lang="fr-BE"/>
           </a:p>
@@ -1557,7 +1596,7 @@
           <a:p>
             <a:fld id="{AFF9D4DE-D345-4225-9BC5-22E5FE69C334}" type="slidenum">
               <a:rPr lang="fr-BE" smtClean="0"/>
-              <a:t>‹#›</a:t>
+              <a:t>‹N°›</a:t>
             </a:fld>
             <a:endParaRPr lang="fr-BE"/>
           </a:p>
@@ -1918,7 +1957,7 @@
           <a:p>
             <a:fld id="{FCC507AA-0AF3-499F-8B74-17B245327FCA}" type="datetimeFigureOut">
               <a:rPr lang="fr-BE" smtClean="0"/>
-              <a:t>04-12-25</a:t>
+              <a:t>07-12-25</a:t>
             </a:fld>
             <a:endParaRPr lang="fr-BE"/>
           </a:p>
@@ -1972,7 +2011,7 @@
           <a:p>
             <a:fld id="{AFF9D4DE-D345-4225-9BC5-22E5FE69C334}" type="slidenum">
               <a:rPr lang="fr-BE" smtClean="0"/>
-              <a:t>‹#›</a:t>
+              <a:t>‹N°›</a:t>
             </a:fld>
             <a:endParaRPr lang="fr-BE"/>
           </a:p>
@@ -2060,7 +2099,7 @@
           <a:p>
             <a:fld id="{FCC507AA-0AF3-499F-8B74-17B245327FCA}" type="datetimeFigureOut">
               <a:rPr lang="fr-BE" smtClean="0"/>
-              <a:t>04-12-25</a:t>
+              <a:t>07-12-25</a:t>
             </a:fld>
             <a:endParaRPr lang="fr-BE"/>
           </a:p>
@@ -2114,7 +2153,7 @@
           <a:p>
             <a:fld id="{AFF9D4DE-D345-4225-9BC5-22E5FE69C334}" type="slidenum">
               <a:rPr lang="fr-BE" smtClean="0"/>
-              <a:t>‹#›</a:t>
+              <a:t>‹N°›</a:t>
             </a:fld>
             <a:endParaRPr lang="fr-BE"/>
           </a:p>
@@ -2173,7 +2212,7 @@
           <a:p>
             <a:fld id="{FCC507AA-0AF3-499F-8B74-17B245327FCA}" type="datetimeFigureOut">
               <a:rPr lang="fr-BE" smtClean="0"/>
-              <a:t>04-12-25</a:t>
+              <a:t>07-12-25</a:t>
             </a:fld>
             <a:endParaRPr lang="fr-BE"/>
           </a:p>
@@ -2227,7 +2266,7 @@
           <a:p>
             <a:fld id="{AFF9D4DE-D345-4225-9BC5-22E5FE69C334}" type="slidenum">
               <a:rPr lang="fr-BE" smtClean="0"/>
-              <a:t>‹#›</a:t>
+              <a:t>‹N°›</a:t>
             </a:fld>
             <a:endParaRPr lang="fr-BE"/>
           </a:p>
@@ -2486,7 +2525,7 @@
           <a:p>
             <a:fld id="{FCC507AA-0AF3-499F-8B74-17B245327FCA}" type="datetimeFigureOut">
               <a:rPr lang="fr-BE" smtClean="0"/>
-              <a:t>04-12-25</a:t>
+              <a:t>07-12-25</a:t>
             </a:fld>
             <a:endParaRPr lang="fr-BE"/>
           </a:p>
@@ -2540,7 +2579,7 @@
           <a:p>
             <a:fld id="{AFF9D4DE-D345-4225-9BC5-22E5FE69C334}" type="slidenum">
               <a:rPr lang="fr-BE" smtClean="0"/>
-              <a:t>‹#›</a:t>
+              <a:t>‹N°›</a:t>
             </a:fld>
             <a:endParaRPr lang="fr-BE"/>
           </a:p>
@@ -2775,7 +2814,7 @@
           <a:p>
             <a:fld id="{FCC507AA-0AF3-499F-8B74-17B245327FCA}" type="datetimeFigureOut">
               <a:rPr lang="fr-BE" smtClean="0"/>
-              <a:t>04-12-25</a:t>
+              <a:t>07-12-25</a:t>
             </a:fld>
             <a:endParaRPr lang="fr-BE"/>
           </a:p>
@@ -2829,7 +2868,7 @@
           <a:p>
             <a:fld id="{AFF9D4DE-D345-4225-9BC5-22E5FE69C334}" type="slidenum">
               <a:rPr lang="fr-BE" smtClean="0"/>
-              <a:t>‹#›</a:t>
+              <a:t>‹N°›</a:t>
             </a:fld>
             <a:endParaRPr lang="fr-BE"/>
           </a:p>
@@ -3018,7 +3057,7 @@
           <a:p>
             <a:fld id="{FCC507AA-0AF3-499F-8B74-17B245327FCA}" type="datetimeFigureOut">
               <a:rPr lang="fr-BE" smtClean="0"/>
-              <a:t>04-12-25</a:t>
+              <a:t>07-12-25</a:t>
             </a:fld>
             <a:endParaRPr lang="fr-BE"/>
           </a:p>
@@ -3108,7 +3147,7 @@
           <a:p>
             <a:fld id="{AFF9D4DE-D345-4225-9BC5-22E5FE69C334}" type="slidenum">
               <a:rPr lang="fr-BE" smtClean="0"/>
-              <a:t>‹#›</a:t>
+              <a:t>‹N°›</a:t>
             </a:fld>
             <a:endParaRPr lang="fr-BE"/>
           </a:p>
@@ -3702,6 +3741,9 @@
             <a:endParaRPr lang="fr-BE" dirty="0"/>
           </a:p>
           <a:p>
+            <a:endParaRPr lang="fr-BE" dirty="0"/>
+          </a:p>
+          <a:p>
             <a:r>
               <a:rPr lang="fr-BE" dirty="0"/>
               <a:t>En général : </a:t>
@@ -3720,13 +3762,8 @@
             </a:r>
             <a:r>
               <a:rPr lang="fr-BE" dirty="0"/>
-              <a:t> et truc[valeur] ), savoir quoi mettre dans ou hors </a:t>
-            </a:r>
-            <a:r>
-              <a:rPr lang="fr-BE"/>
-              <a:t>d’une fonction…</a:t>
-            </a:r>
-            <a:endParaRPr lang="fr-BE" dirty="0"/>
+              <a:t> et truc[valeur] ), savoir quoi mettre dans ou hors d’une fonction…</a:t>
+            </a:r>
           </a:p>
           <a:p>
             <a:pPr marL="0" indent="0">

</xml_diff>

<commit_message>
pwp : 3 devient 3.5
</commit_message>
<xml_diff>
--- a/Workshop_Presentation.pptx
+++ b/Workshop_Presentation.pptx
@@ -123,7 +123,7 @@
   <pc:docChgLst>
     <pc:chgData name="Caroline Poveda" userId="dcb7646f-c2e8-4537-bd71-c5d58d22a638" providerId="ADAL" clId="{2A135C5D-1DDC-44B7-8D81-AC641D8C7C10}"/>
     <pc:docChg chg="custSel modSld">
-      <pc:chgData name="Caroline Poveda" userId="dcb7646f-c2e8-4537-bd71-c5d58d22a638" providerId="ADAL" clId="{2A135C5D-1DDC-44B7-8D81-AC641D8C7C10}" dt="2025-12-04T10:31:39.123" v="350" actId="5793"/>
+      <pc:chgData name="Caroline Poveda" userId="dcb7646f-c2e8-4537-bd71-c5d58d22a638" providerId="ADAL" clId="{2A135C5D-1DDC-44B7-8D81-AC641D8C7C10}" dt="2025-12-15T08:37:30.118" v="356" actId="20577"/>
       <pc:docMkLst>
         <pc:docMk/>
       </pc:docMkLst>
@@ -195,6 +195,21 @@
           </ac:spMkLst>
         </pc:spChg>
       </pc:sldChg>
+      <pc:sldChg chg="modSp mod">
+        <pc:chgData name="Caroline Poveda" userId="dcb7646f-c2e8-4537-bd71-c5d58d22a638" providerId="ADAL" clId="{2A135C5D-1DDC-44B7-8D81-AC641D8C7C10}" dt="2025-12-15T08:37:30.118" v="356" actId="20577"/>
+        <pc:sldMkLst>
+          <pc:docMk/>
+          <pc:sldMk cId="1946199155" sldId="262"/>
+        </pc:sldMkLst>
+        <pc:spChg chg="mod">
+          <ac:chgData name="Caroline Poveda" userId="dcb7646f-c2e8-4537-bd71-c5d58d22a638" providerId="ADAL" clId="{2A135C5D-1DDC-44B7-8D81-AC641D8C7C10}" dt="2025-12-15T08:37:30.118" v="356" actId="20577"/>
+          <ac:spMkLst>
+            <pc:docMk/>
+            <pc:sldMk cId="1946199155" sldId="262"/>
+            <ac:spMk id="3" creationId="{6EB983EE-05C6-E7B3-514F-9FFD4F6780B1}"/>
+          </ac:spMkLst>
+        </pc:spChg>
+      </pc:sldChg>
     </pc:docChg>
   </pc:docChgLst>
   <pc:docChgLst>
@@ -442,7 +457,7 @@
           <a:p>
             <a:fld id="{AFF9D4DE-D345-4225-9BC5-22E5FE69C334}" type="slidenum">
               <a:rPr lang="fr-BE" smtClean="0"/>
-              <a:t>‹N°›</a:t>
+              <a:t>‹#›</a:t>
             </a:fld>
             <a:endParaRPr lang="fr-BE"/>
           </a:p>
@@ -642,7 +657,7 @@
           <a:p>
             <a:fld id="{AFF9D4DE-D345-4225-9BC5-22E5FE69C334}" type="slidenum">
               <a:rPr lang="fr-BE" smtClean="0"/>
-              <a:t>‹N°›</a:t>
+              <a:t>‹#›</a:t>
             </a:fld>
             <a:endParaRPr lang="fr-BE"/>
           </a:p>
@@ -852,7 +867,7 @@
           <a:p>
             <a:fld id="{AFF9D4DE-D345-4225-9BC5-22E5FE69C334}" type="slidenum">
               <a:rPr lang="fr-BE" smtClean="0"/>
-              <a:t>‹N°›</a:t>
+              <a:t>‹#›</a:t>
             </a:fld>
             <a:endParaRPr lang="fr-BE"/>
           </a:p>
@@ -1052,7 +1067,7 @@
           <a:p>
             <a:fld id="{AFF9D4DE-D345-4225-9BC5-22E5FE69C334}" type="slidenum">
               <a:rPr lang="fr-BE" smtClean="0"/>
-              <a:t>‹N°›</a:t>
+              <a:t>‹#›</a:t>
             </a:fld>
             <a:endParaRPr lang="fr-BE"/>
           </a:p>
@@ -1328,7 +1343,7 @@
           <a:p>
             <a:fld id="{AFF9D4DE-D345-4225-9BC5-22E5FE69C334}" type="slidenum">
               <a:rPr lang="fr-BE" smtClean="0"/>
-              <a:t>‹N°›</a:t>
+              <a:t>‹#›</a:t>
             </a:fld>
             <a:endParaRPr lang="fr-BE"/>
           </a:p>
@@ -1596,7 +1611,7 @@
           <a:p>
             <a:fld id="{AFF9D4DE-D345-4225-9BC5-22E5FE69C334}" type="slidenum">
               <a:rPr lang="fr-BE" smtClean="0"/>
-              <a:t>‹N°›</a:t>
+              <a:t>‹#›</a:t>
             </a:fld>
             <a:endParaRPr lang="fr-BE"/>
           </a:p>
@@ -2011,7 +2026,7 @@
           <a:p>
             <a:fld id="{AFF9D4DE-D345-4225-9BC5-22E5FE69C334}" type="slidenum">
               <a:rPr lang="fr-BE" smtClean="0"/>
-              <a:t>‹N°›</a:t>
+              <a:t>‹#›</a:t>
             </a:fld>
             <a:endParaRPr lang="fr-BE"/>
           </a:p>
@@ -2153,7 +2168,7 @@
           <a:p>
             <a:fld id="{AFF9D4DE-D345-4225-9BC5-22E5FE69C334}" type="slidenum">
               <a:rPr lang="fr-BE" smtClean="0"/>
-              <a:t>‹N°›</a:t>
+              <a:t>‹#›</a:t>
             </a:fld>
             <a:endParaRPr lang="fr-BE"/>
           </a:p>
@@ -2266,7 +2281,7 @@
           <a:p>
             <a:fld id="{AFF9D4DE-D345-4225-9BC5-22E5FE69C334}" type="slidenum">
               <a:rPr lang="fr-BE" smtClean="0"/>
-              <a:t>‹N°›</a:t>
+              <a:t>‹#›</a:t>
             </a:fld>
             <a:endParaRPr lang="fr-BE"/>
           </a:p>
@@ -2579,7 +2594,7 @@
           <a:p>
             <a:fld id="{AFF9D4DE-D345-4225-9BC5-22E5FE69C334}" type="slidenum">
               <a:rPr lang="fr-BE" smtClean="0"/>
-              <a:t>‹N°›</a:t>
+              <a:t>‹#›</a:t>
             </a:fld>
             <a:endParaRPr lang="fr-BE"/>
           </a:p>
@@ -2868,7 +2883,7 @@
           <a:p>
             <a:fld id="{AFF9D4DE-D345-4225-9BC5-22E5FE69C334}" type="slidenum">
               <a:rPr lang="fr-BE" smtClean="0"/>
-              <a:t>‹N°›</a:t>
+              <a:t>‹#›</a:t>
             </a:fld>
             <a:endParaRPr lang="fr-BE"/>
           </a:p>
@@ -3147,7 +3162,7 @@
           <a:p>
             <a:fld id="{AFF9D4DE-D345-4225-9BC5-22E5FE69C334}" type="slidenum">
               <a:rPr lang="fr-BE" smtClean="0"/>
-              <a:t>‹N°›</a:t>
+              <a:t>‹#›</a:t>
             </a:fld>
             <a:endParaRPr lang="fr-BE"/>
           </a:p>
@@ -4526,14 +4541,18 @@
             <a:pPr lvl="2"/>
             <a:r>
               <a:rPr lang="fr-BE" sz="1600" dirty="0"/>
-              <a:t>≤ 3 → À surveiller</a:t>
+              <a:t>≤ 3,5 → À surveiller</a:t>
             </a:r>
           </a:p>
           <a:p>
             <a:pPr lvl="2"/>
             <a:r>
+              <a:rPr lang="fr-BE" sz="1600"/>
+              <a:t>3,6 </a:t>
+            </a:r>
+            <a:r>
               <a:rPr lang="fr-BE" sz="1600" dirty="0"/>
-              <a:t>3 → Préoccupant</a:t>
+              <a:t>→ Préoccupant</a:t>
             </a:r>
           </a:p>
           <a:p>

</xml_diff>